<commit_message>
add strategy pattern example
</commit_message>
<xml_diff>
--- a/T1. Design Patterns/Flyweight/Demo.pptx
+++ b/T1. Design Patterns/Flyweight/Demo.pptx
@@ -212,7 +212,7 @@
           <a:p>
             <a:fld id="{C6576F63-835E-46F5-AEB3-90A06FD74112}" type="datetimeFigureOut">
               <a:rPr lang="en-US" smtClean="0"/>
-              <a:t>8/14/2018</a:t>
+              <a:t>11/1/2018</a:t>
             </a:fld>
             <a:endParaRPr lang="en-US"/>
           </a:p>
@@ -523,6 +523,214 @@
           <a:bodyPr/>
           <a:lstStyle/>
           <a:p>
+            <a:r>
+              <a:rPr lang="ru-RU" dirty="0" smtClean="0"/>
+              <a:t>Проектирование объектов вплоть до самых низких уровней «гранулярности» системы обеспечивает оптимальную гибкость, но может быть неприемлемо дорогим с точки зрения производительности и использования памяти.</a:t>
+            </a:r>
+            <a:endParaRPr lang="en-US" dirty="0"/>
+          </a:p>
+        </p:txBody>
+      </p:sp>
+      <p:sp>
+        <p:nvSpPr>
+          <p:cNvPr id="4" name="Slide Number Placeholder 3"/>
+          <p:cNvSpPr>
+            <a:spLocks noGrp="1"/>
+          </p:cNvSpPr>
+          <p:nvPr>
+            <p:ph type="sldNum" sz="quarter" idx="10"/>
+          </p:nvPr>
+        </p:nvSpPr>
+        <p:spPr/>
+        <p:txBody>
+          <a:bodyPr/>
+          <a:lstStyle/>
+          <a:p>
+            <a:fld id="{F620B9DD-4E80-470F-B438-047D7BDD8590}" type="slidenum">
+              <a:rPr lang="en-US" smtClean="0"/>
+              <a:t>4</a:t>
+            </a:fld>
+            <a:endParaRPr lang="en-US"/>
+          </a:p>
+        </p:txBody>
+      </p:sp>
+    </p:spTree>
+    <p:extLst>
+      <p:ext uri="{BB962C8B-B14F-4D97-AF65-F5344CB8AC3E}">
+        <p14:creationId xmlns:p14="http://schemas.microsoft.com/office/powerpoint/2010/main" val="3046917271"/>
+      </p:ext>
+    </p:extLst>
+  </p:cSld>
+  <p:clrMapOvr>
+    <a:masterClrMapping/>
+  </p:clrMapOvr>
+</p:notes>
+</file>
+
+<file path=ppt/notesSlides/notesSlide2.xml><?xml version="1.0" encoding="utf-8"?>
+<p:notes xmlns:a="http://schemas.openxmlformats.org/drawingml/2006/main" xmlns:r="http://schemas.openxmlformats.org/officeDocument/2006/relationships" xmlns:p="http://schemas.openxmlformats.org/presentationml/2006/main">
+  <p:cSld>
+    <p:spTree>
+      <p:nvGrpSpPr>
+        <p:cNvPr id="1" name=""/>
+        <p:cNvGrpSpPr/>
+        <p:nvPr/>
+      </p:nvGrpSpPr>
+      <p:grpSpPr>
+        <a:xfrm>
+          <a:off x="0" y="0"/>
+          <a:ext cx="0" cy="0"/>
+          <a:chOff x="0" y="0"/>
+          <a:chExt cx="0" cy="0"/>
+        </a:xfrm>
+      </p:grpSpPr>
+      <p:sp>
+        <p:nvSpPr>
+          <p:cNvPr id="2" name="Slide Image Placeholder 1"/>
+          <p:cNvSpPr>
+            <a:spLocks noGrp="1" noRot="1" noChangeAspect="1"/>
+          </p:cNvSpPr>
+          <p:nvPr>
+            <p:ph type="sldImg"/>
+          </p:nvPr>
+        </p:nvSpPr>
+        <p:spPr/>
+      </p:sp>
+      <p:sp>
+        <p:nvSpPr>
+          <p:cNvPr id="3" name="Notes Placeholder 2"/>
+          <p:cNvSpPr>
+            <a:spLocks noGrp="1"/>
+          </p:cNvSpPr>
+          <p:nvPr>
+            <p:ph type="body" idx="1"/>
+          </p:nvPr>
+        </p:nvSpPr>
+        <p:spPr/>
+        <p:txBody>
+          <a:bodyPr/>
+          <a:lstStyle/>
+          <a:p>
+            <a:r>
+              <a:rPr lang="ru-RU" dirty="0" smtClean="0"/>
+              <a:t>Шаблон </a:t>
+            </a:r>
+            <a:r>
+              <a:rPr lang="ru-RU" dirty="0" err="1" smtClean="0"/>
+              <a:t>Flyweight</a:t>
+            </a:r>
+            <a:r>
+              <a:rPr lang="ru-RU" dirty="0" smtClean="0"/>
+              <a:t> описывает, как обмениваться объектами, чтобы их использование можно было использовать при тонкой детализации без чрезмерной стоимости. Каждый «</a:t>
+            </a:r>
+            <a:r>
+              <a:rPr lang="en-US" dirty="0" smtClean="0"/>
+              <a:t>flyweight</a:t>
+            </a:r>
+            <a:r>
+              <a:rPr lang="ru-RU" dirty="0" smtClean="0"/>
+              <a:t>» объект разделен на две части: состояние-зависимой (внешней) стороны, и состояние-независимого (внутренней) части. Внутреннее состояние сохраняется (совместно используется) в объекте </a:t>
+            </a:r>
+            <a:r>
+              <a:rPr lang="ru-RU" dirty="0" err="1" smtClean="0"/>
+              <a:t>Flyweight</a:t>
+            </a:r>
+            <a:r>
+              <a:rPr lang="ru-RU" dirty="0" smtClean="0"/>
+              <a:t>. Внешнее состояние хранится или вычисляется клиентскими объектами и передается </a:t>
+            </a:r>
+            <a:r>
+              <a:rPr lang="ru-RU" dirty="0" err="1" smtClean="0"/>
+              <a:t>Flyweight</a:t>
+            </a:r>
+            <a:r>
+              <a:rPr lang="ru-RU" dirty="0" smtClean="0"/>
+              <a:t> при его выполнении.</a:t>
+            </a:r>
+            <a:endParaRPr lang="en-US" dirty="0"/>
+          </a:p>
+        </p:txBody>
+      </p:sp>
+      <p:sp>
+        <p:nvSpPr>
+          <p:cNvPr id="4" name="Slide Number Placeholder 3"/>
+          <p:cNvSpPr>
+            <a:spLocks noGrp="1"/>
+          </p:cNvSpPr>
+          <p:nvPr>
+            <p:ph type="sldNum" sz="quarter" idx="10"/>
+          </p:nvPr>
+        </p:nvSpPr>
+        <p:spPr/>
+        <p:txBody>
+          <a:bodyPr/>
+          <a:lstStyle/>
+          <a:p>
+            <a:fld id="{F620B9DD-4E80-470F-B438-047D7BDD8590}" type="slidenum">
+              <a:rPr lang="en-US" smtClean="0"/>
+              <a:t>5</a:t>
+            </a:fld>
+            <a:endParaRPr lang="en-US"/>
+          </a:p>
+        </p:txBody>
+      </p:sp>
+    </p:spTree>
+    <p:extLst>
+      <p:ext uri="{BB962C8B-B14F-4D97-AF65-F5344CB8AC3E}">
+        <p14:creationId xmlns:p14="http://schemas.microsoft.com/office/powerpoint/2010/main" val="3087908561"/>
+      </p:ext>
+    </p:extLst>
+  </p:cSld>
+  <p:clrMapOvr>
+    <a:masterClrMapping/>
+  </p:clrMapOvr>
+</p:notes>
+</file>
+
+<file path=ppt/notesSlides/notesSlide3.xml><?xml version="1.0" encoding="utf-8"?>
+<p:notes xmlns:a="http://schemas.openxmlformats.org/drawingml/2006/main" xmlns:r="http://schemas.openxmlformats.org/officeDocument/2006/relationships" xmlns:p="http://schemas.openxmlformats.org/presentationml/2006/main">
+  <p:cSld>
+    <p:spTree>
+      <p:nvGrpSpPr>
+        <p:cNvPr id="1" name=""/>
+        <p:cNvGrpSpPr/>
+        <p:nvPr/>
+      </p:nvGrpSpPr>
+      <p:grpSpPr>
+        <a:xfrm>
+          <a:off x="0" y="0"/>
+          <a:ext cx="0" cy="0"/>
+          <a:chOff x="0" y="0"/>
+          <a:chExt cx="0" cy="0"/>
+        </a:xfrm>
+      </p:grpSpPr>
+      <p:sp>
+        <p:nvSpPr>
+          <p:cNvPr id="2" name="Slide Image Placeholder 1"/>
+          <p:cNvSpPr>
+            <a:spLocks noGrp="1" noRot="1" noChangeAspect="1"/>
+          </p:cNvSpPr>
+          <p:nvPr>
+            <p:ph type="sldImg"/>
+          </p:nvPr>
+        </p:nvSpPr>
+        <p:spPr/>
+      </p:sp>
+      <p:sp>
+        <p:nvSpPr>
+          <p:cNvPr id="3" name="Notes Placeholder 2"/>
+          <p:cNvSpPr>
+            <a:spLocks noGrp="1"/>
+          </p:cNvSpPr>
+          <p:nvPr>
+            <p:ph type="body" idx="1"/>
+          </p:nvPr>
+        </p:nvSpPr>
+        <p:spPr/>
+        <p:txBody>
+          <a:bodyPr/>
+          <a:lstStyle/>
+          <a:p>
             <a:endParaRPr lang="en-US" dirty="0"/>
           </a:p>
         </p:txBody>
@@ -563,7 +771,7 @@
 </p:notes>
 </file>
 
-<file path=ppt/notesSlides/notesSlide2.xml><?xml version="1.0" encoding="utf-8"?>
+<file path=ppt/notesSlides/notesSlide4.xml><?xml version="1.0" encoding="utf-8"?>
 <p:notes xmlns:a="http://schemas.openxmlformats.org/drawingml/2006/main" xmlns:r="http://schemas.openxmlformats.org/officeDocument/2006/relationships" xmlns:p="http://schemas.openxmlformats.org/presentationml/2006/main">
   <p:cSld>
     <p:spTree>
@@ -3205,11 +3413,7 @@
           <a:p>
             <a:r>
               <a:rPr lang="en-US" dirty="0" smtClean="0"/>
-              <a:t>Design Patterns. </a:t>
-            </a:r>
-            <a:r>
-              <a:rPr lang="en-US" dirty="0" smtClean="0"/>
-              <a:t>Flyweight</a:t>
+              <a:t>Design Patterns. Flyweight</a:t>
             </a:r>
             <a:r>
               <a:rPr lang="en-US" b="1" dirty="0"/>
@@ -3304,7 +3508,6 @@
               <a:rPr lang="en-US" dirty="0"/>
               <a:t>The Flyweight uses sharing to support large numbers of objects efficiently. Modern web browsers use this technique to prevent loading same images twice. When browser loads a web page, it traverse through all images on that page. Browser loads all new images from Internet and places them the internal cache. For already loaded images, a flyweight object is created, which has some unique data like position within the page, but everything else is referenced to the cached one.</a:t>
             </a:r>
-            <a:endParaRPr lang="en-US" dirty="0"/>
           </a:p>
         </p:txBody>
       </p:sp>
@@ -4170,7 +4373,6 @@
               <a:rPr lang="en-US" dirty="0"/>
               <a:t>Designing objects down to the lowest levels of system "granularity" provides optimal flexibility, but can be unacceptably expensive in terms of performance and memory usage.</a:t>
             </a:r>
-            <a:endParaRPr lang="en-US" dirty="0"/>
           </a:p>
         </p:txBody>
       </p:sp>
@@ -4254,7 +4456,6 @@
               <a:rPr lang="en-US" dirty="0"/>
               <a:t>The Flyweight pattern describes how to share objects to allow their use at fine granularity without prohibitive cost. Each "flyweight" object is divided into two pieces: the state-dependent (extrinsic) part, and the state-independent (intrinsic) part. Intrinsic state is stored (shared) in the Flyweight object. Extrinsic state is stored or computed by client objects, and passed to the Flyweight when its operations are invoked.</a:t>
             </a:r>
-            <a:endParaRPr lang="en-US" dirty="0"/>
           </a:p>
         </p:txBody>
       </p:sp>
@@ -4343,7 +4544,6 @@
               <a:rPr lang="en-US" dirty="0"/>
               <a:t>An illustration of this approach would be Motif widgets that have been re-engineered as light-weight gadgets. Whereas widgets are "intelligent" enough to stand on their own; gadgets exist in a dependent relationship with their parent layout manager widget. Each layout manager provides context-dependent event handling, real estate management, and resource services to its flyweight gadgets, and each gadget is only responsible for context-independent state and behavior.</a:t>
             </a:r>
-            <a:endParaRPr lang="en-US" dirty="0"/>
           </a:p>
         </p:txBody>
       </p:sp>
@@ -4432,7 +4632,6 @@
               <a:rPr lang="en-US" dirty="0"/>
               <a:t>Flyweights are stored in a Factory's repository. The client restrains herself from creating Flyweights directly, and requests them from the Factory. Each Flyweight cannot stand on its own. Any attributes that would make sharing impossible must be supplied by the client whenever a request is made of the Flyweight. If the context lends itself to "economy of scale" (i.e. the client can easily compute or look-up the necessary attributes), then the Flyweight pattern offers appropriate leverage.</a:t>
             </a:r>
-            <a:endParaRPr lang="en-US" dirty="0"/>
           </a:p>
         </p:txBody>
       </p:sp>

</xml_diff>